<commit_message>
Tillfällig presentation del2, uppdaterad
</commit_message>
<xml_diff>
--- a/TDD.pptx
+++ b/TDD.pptx
@@ -7,10 +7,11 @@
   <p:sldIdLst>
     <p:sldId id="256" r:id="rId2"/>
     <p:sldId id="257" r:id="rId3"/>
-    <p:sldId id="258" r:id="rId4"/>
-    <p:sldId id="260" r:id="rId5"/>
-    <p:sldId id="259" r:id="rId6"/>
-    <p:sldId id="261" r:id="rId7"/>
+    <p:sldId id="262" r:id="rId4"/>
+    <p:sldId id="258" r:id="rId5"/>
+    <p:sldId id="260" r:id="rId6"/>
+    <p:sldId id="259" r:id="rId7"/>
+    <p:sldId id="261" r:id="rId8"/>
   </p:sldIdLst>
   <p:sldSz cx="12192000" cy="6858000"/>
   <p:notesSz cx="6858000" cy="9144000"/>
@@ -264,7 +265,7 @@
           <a:p>
             <a:fld id="{35AE7234-D0C5-45C2-87A9-A58D9B665CD7}" type="datetimeFigureOut">
               <a:rPr lang="sv-SE" smtClean="0"/>
-              <a:t>2020-01-25</a:t>
+              <a:t>2020-01-26</a:t>
             </a:fld>
             <a:endParaRPr lang="sv-SE"/>
           </a:p>
@@ -462,7 +463,7 @@
           <a:p>
             <a:fld id="{35AE7234-D0C5-45C2-87A9-A58D9B665CD7}" type="datetimeFigureOut">
               <a:rPr lang="sv-SE" smtClean="0"/>
-              <a:t>2020-01-25</a:t>
+              <a:t>2020-01-26</a:t>
             </a:fld>
             <a:endParaRPr lang="sv-SE"/>
           </a:p>
@@ -670,7 +671,7 @@
           <a:p>
             <a:fld id="{35AE7234-D0C5-45C2-87A9-A58D9B665CD7}" type="datetimeFigureOut">
               <a:rPr lang="sv-SE" smtClean="0"/>
-              <a:t>2020-01-25</a:t>
+              <a:t>2020-01-26</a:t>
             </a:fld>
             <a:endParaRPr lang="sv-SE"/>
           </a:p>
@@ -868,7 +869,7 @@
           <a:p>
             <a:fld id="{35AE7234-D0C5-45C2-87A9-A58D9B665CD7}" type="datetimeFigureOut">
               <a:rPr lang="sv-SE" smtClean="0"/>
-              <a:t>2020-01-25</a:t>
+              <a:t>2020-01-26</a:t>
             </a:fld>
             <a:endParaRPr lang="sv-SE"/>
           </a:p>
@@ -1143,7 +1144,7 @@
           <a:p>
             <a:fld id="{35AE7234-D0C5-45C2-87A9-A58D9B665CD7}" type="datetimeFigureOut">
               <a:rPr lang="sv-SE" smtClean="0"/>
-              <a:t>2020-01-25</a:t>
+              <a:t>2020-01-26</a:t>
             </a:fld>
             <a:endParaRPr lang="sv-SE"/>
           </a:p>
@@ -1408,7 +1409,7 @@
           <a:p>
             <a:fld id="{35AE7234-D0C5-45C2-87A9-A58D9B665CD7}" type="datetimeFigureOut">
               <a:rPr lang="sv-SE" smtClean="0"/>
-              <a:t>2020-01-25</a:t>
+              <a:t>2020-01-26</a:t>
             </a:fld>
             <a:endParaRPr lang="sv-SE"/>
           </a:p>
@@ -1820,7 +1821,7 @@
           <a:p>
             <a:fld id="{35AE7234-D0C5-45C2-87A9-A58D9B665CD7}" type="datetimeFigureOut">
               <a:rPr lang="sv-SE" smtClean="0"/>
-              <a:t>2020-01-25</a:t>
+              <a:t>2020-01-26</a:t>
             </a:fld>
             <a:endParaRPr lang="sv-SE"/>
           </a:p>
@@ -1961,7 +1962,7 @@
           <a:p>
             <a:fld id="{35AE7234-D0C5-45C2-87A9-A58D9B665CD7}" type="datetimeFigureOut">
               <a:rPr lang="sv-SE" smtClean="0"/>
-              <a:t>2020-01-25</a:t>
+              <a:t>2020-01-26</a:t>
             </a:fld>
             <a:endParaRPr lang="sv-SE"/>
           </a:p>
@@ -2074,7 +2075,7 @@
           <a:p>
             <a:fld id="{35AE7234-D0C5-45C2-87A9-A58D9B665CD7}" type="datetimeFigureOut">
               <a:rPr lang="sv-SE" smtClean="0"/>
-              <a:t>2020-01-25</a:t>
+              <a:t>2020-01-26</a:t>
             </a:fld>
             <a:endParaRPr lang="sv-SE"/>
           </a:p>
@@ -2385,7 +2386,7 @@
           <a:p>
             <a:fld id="{35AE7234-D0C5-45C2-87A9-A58D9B665CD7}" type="datetimeFigureOut">
               <a:rPr lang="sv-SE" smtClean="0"/>
-              <a:t>2020-01-25</a:t>
+              <a:t>2020-01-26</a:t>
             </a:fld>
             <a:endParaRPr lang="sv-SE"/>
           </a:p>
@@ -2673,7 +2674,7 @@
           <a:p>
             <a:fld id="{35AE7234-D0C5-45C2-87A9-A58D9B665CD7}" type="datetimeFigureOut">
               <a:rPr lang="sv-SE" smtClean="0"/>
-              <a:t>2020-01-25</a:t>
+              <a:t>2020-01-26</a:t>
             </a:fld>
             <a:endParaRPr lang="sv-SE"/>
           </a:p>
@@ -2914,7 +2915,7 @@
           <a:p>
             <a:fld id="{35AE7234-D0C5-45C2-87A9-A58D9B665CD7}" type="datetimeFigureOut">
               <a:rPr lang="sv-SE" smtClean="0"/>
-              <a:t>2020-01-25</a:t>
+              <a:t>2020-01-26</a:t>
             </a:fld>
             <a:endParaRPr lang="sv-SE"/>
           </a:p>
@@ -3454,11 +3455,19 @@
           <a:p>
             <a:r>
               <a:rPr lang="sv-SE" dirty="0"/>
-              <a:t>Verktyg - </a:t>
+              <a:t>Verktyg – </a:t>
             </a:r>
             <a:r>
               <a:rPr lang="sv-SE" dirty="0" err="1"/>
               <a:t>testkörare</a:t>
+            </a:r>
+            <a:r>
+              <a:rPr lang="sv-SE" dirty="0"/>
+              <a:t> </a:t>
+            </a:r>
+            <a:r>
+              <a:rPr lang="sv-SE" dirty="0" err="1"/>
+              <a:t>jvm</a:t>
             </a:r>
             <a:endParaRPr lang="sv-SE" dirty="0"/>
           </a:p>
@@ -3580,7 +3589,7 @@
           <p:cNvPr id="2" name="Rubrik 1">
             <a:extLst>
               <a:ext uri="{FF2B5EF4-FFF2-40B4-BE49-F238E27FC236}">
-                <a16:creationId xmlns:a16="http://schemas.microsoft.com/office/drawing/2014/main" id="{4F3FB301-E7D9-4408-A5EE-67E885D62779}"/>
+                <a16:creationId xmlns:a16="http://schemas.microsoft.com/office/drawing/2014/main" id="{AD7502EA-21F9-4AA2-AE5E-F46B198DD423}"/>
               </a:ext>
             </a:extLst>
           </p:cNvPr>
@@ -3598,11 +3607,19 @@
           <a:p>
             <a:r>
               <a:rPr lang="sv-SE" dirty="0"/>
-              <a:t>Verktyg - </a:t>
+              <a:t>Verktyg – </a:t>
             </a:r>
             <a:r>
               <a:rPr lang="sv-SE" dirty="0" err="1"/>
-              <a:t>Assertions</a:t>
+              <a:t>testkörare</a:t>
+            </a:r>
+            <a:r>
+              <a:rPr lang="sv-SE" dirty="0"/>
+              <a:t> </a:t>
+            </a:r>
+            <a:r>
+              <a:rPr lang="sv-SE" dirty="0" err="1"/>
+              <a:t>javascript</a:t>
             </a:r>
             <a:endParaRPr lang="sv-SE" dirty="0"/>
           </a:p>
@@ -3613,7 +3630,7 @@
           <p:cNvPr id="3" name="Platshållare för innehåll 2">
             <a:extLst>
               <a:ext uri="{FF2B5EF4-FFF2-40B4-BE49-F238E27FC236}">
-                <a16:creationId xmlns:a16="http://schemas.microsoft.com/office/drawing/2014/main" id="{D22E0489-F6F3-4B4D-B4BA-BE021BCEE690}"/>
+                <a16:creationId xmlns:a16="http://schemas.microsoft.com/office/drawing/2014/main" id="{444C64AA-D178-4A96-A59A-8027C29B9B8D}"/>
               </a:ext>
             </a:extLst>
           </p:cNvPr>
@@ -3624,48 +3641,35 @@
             <p:ph idx="1"/>
           </p:nvPr>
         </p:nvSpPr>
-        <p:spPr>
-          <a:xfrm>
-            <a:off x="824345" y="1825625"/>
-            <a:ext cx="10515600" cy="4351338"/>
-          </a:xfrm>
-        </p:spPr>
+        <p:spPr/>
         <p:txBody>
           <a:bodyPr/>
           <a:lstStyle/>
           <a:p>
             <a:r>
               <a:rPr lang="sv-SE" dirty="0" err="1"/>
-              <a:t>AssertJ</a:t>
+              <a:t>MochaJS</a:t>
             </a:r>
             <a:endParaRPr lang="sv-SE" dirty="0"/>
           </a:p>
           <a:p>
             <a:r>
-              <a:rPr lang="sv-SE" dirty="0" err="1"/>
-              <a:t>Hamcrest</a:t>
-            </a:r>
-            <a:endParaRPr lang="sv-SE" dirty="0"/>
-          </a:p>
-          <a:p>
-            <a:r>
-              <a:rPr lang="sv-SE" dirty="0" err="1"/>
-              <a:t>JUnit</a:t>
-            </a:r>
-            <a:endParaRPr lang="sv-SE" dirty="0"/>
-          </a:p>
-          <a:p>
-            <a:pPr marL="0" indent="0">
-              <a:buNone/>
-            </a:pPr>
-            <a:endParaRPr lang="sv-SE" dirty="0"/>
+              <a:rPr lang="sv-SE" dirty="0"/>
+              <a:t>JEST</a:t>
+            </a:r>
+          </a:p>
+          <a:p>
+            <a:r>
+              <a:rPr lang="sv-SE"/>
+              <a:t>Jasmine</a:t>
+            </a:r>
           </a:p>
         </p:txBody>
       </p:sp>
     </p:spTree>
     <p:extLst>
       <p:ext uri="{BB962C8B-B14F-4D97-AF65-F5344CB8AC3E}">
-        <p14:creationId xmlns:p14="http://schemas.microsoft.com/office/powerpoint/2010/main" val="2014358879"/>
+        <p14:creationId xmlns:p14="http://schemas.microsoft.com/office/powerpoint/2010/main" val="925134156"/>
       </p:ext>
     </p:extLst>
   </p:cSld>
@@ -3697,7 +3701,7 @@
           <p:cNvPr id="2" name="Rubrik 1">
             <a:extLst>
               <a:ext uri="{FF2B5EF4-FFF2-40B4-BE49-F238E27FC236}">
-                <a16:creationId xmlns:a16="http://schemas.microsoft.com/office/drawing/2014/main" id="{F8A02F2F-3092-4C29-A85B-B88B6105F3D8}"/>
+                <a16:creationId xmlns:a16="http://schemas.microsoft.com/office/drawing/2014/main" id="{4F3FB301-E7D9-4408-A5EE-67E885D62779}"/>
               </a:ext>
             </a:extLst>
           </p:cNvPr>
@@ -3715,8 +3719,13 @@
           <a:p>
             <a:r>
               <a:rPr lang="sv-SE" dirty="0"/>
-              <a:t>Demo: Introducera prisuppslag</a:t>
-            </a:r>
+              <a:t>Verktyg - </a:t>
+            </a:r>
+            <a:r>
+              <a:rPr lang="sv-SE" dirty="0" err="1"/>
+              <a:t>Assertions</a:t>
+            </a:r>
+            <a:endParaRPr lang="sv-SE" dirty="0"/>
           </a:p>
         </p:txBody>
       </p:sp>
@@ -3725,7 +3734,7 @@
           <p:cNvPr id="3" name="Platshållare för innehåll 2">
             <a:extLst>
               <a:ext uri="{FF2B5EF4-FFF2-40B4-BE49-F238E27FC236}">
-                <a16:creationId xmlns:a16="http://schemas.microsoft.com/office/drawing/2014/main" id="{986C41B0-554C-419B-AA2E-1C769BA25120}"/>
+                <a16:creationId xmlns:a16="http://schemas.microsoft.com/office/drawing/2014/main" id="{D22E0489-F6F3-4B4D-B4BA-BE021BCEE690}"/>
               </a:ext>
             </a:extLst>
           </p:cNvPr>
@@ -3736,22 +3745,48 @@
             <p:ph idx="1"/>
           </p:nvPr>
         </p:nvSpPr>
-        <p:spPr/>
-        <p:txBody>
-          <a:bodyPr/>
-          <a:lstStyle/>
-          <a:p>
-            <a:r>
-              <a:rPr lang="sv-SE" dirty="0"/>
-              <a:t>Vid betalning av kundvagn ska det vara rätt pris</a:t>
-            </a:r>
+        <p:spPr>
+          <a:xfrm>
+            <a:off x="824345" y="1825625"/>
+            <a:ext cx="10515600" cy="4351338"/>
+          </a:xfrm>
+        </p:spPr>
+        <p:txBody>
+          <a:bodyPr/>
+          <a:lstStyle/>
+          <a:p>
+            <a:r>
+              <a:rPr lang="sv-SE" dirty="0" err="1"/>
+              <a:t>AssertJ</a:t>
+            </a:r>
+            <a:endParaRPr lang="sv-SE" dirty="0"/>
+          </a:p>
+          <a:p>
+            <a:r>
+              <a:rPr lang="sv-SE" dirty="0" err="1"/>
+              <a:t>Hamcrest</a:t>
+            </a:r>
+            <a:endParaRPr lang="sv-SE" dirty="0"/>
+          </a:p>
+          <a:p>
+            <a:r>
+              <a:rPr lang="sv-SE" dirty="0" err="1"/>
+              <a:t>JUnit</a:t>
+            </a:r>
+            <a:endParaRPr lang="sv-SE" dirty="0"/>
+          </a:p>
+          <a:p>
+            <a:pPr marL="0" indent="0">
+              <a:buNone/>
+            </a:pPr>
+            <a:endParaRPr lang="sv-SE" dirty="0"/>
           </a:p>
         </p:txBody>
       </p:sp>
     </p:spTree>
     <p:extLst>
       <p:ext uri="{BB962C8B-B14F-4D97-AF65-F5344CB8AC3E}">
-        <p14:creationId xmlns:p14="http://schemas.microsoft.com/office/powerpoint/2010/main" val="2795659944"/>
+        <p14:creationId xmlns:p14="http://schemas.microsoft.com/office/powerpoint/2010/main" val="2014358879"/>
       </p:ext>
     </p:extLst>
   </p:cSld>
@@ -3783,6 +3818,92 @@
           <p:cNvPr id="2" name="Rubrik 1">
             <a:extLst>
               <a:ext uri="{FF2B5EF4-FFF2-40B4-BE49-F238E27FC236}">
+                <a16:creationId xmlns:a16="http://schemas.microsoft.com/office/drawing/2014/main" id="{F8A02F2F-3092-4C29-A85B-B88B6105F3D8}"/>
+              </a:ext>
+            </a:extLst>
+          </p:cNvPr>
+          <p:cNvSpPr>
+            <a:spLocks noGrp="1"/>
+          </p:cNvSpPr>
+          <p:nvPr>
+            <p:ph type="title"/>
+          </p:nvPr>
+        </p:nvSpPr>
+        <p:spPr/>
+        <p:txBody>
+          <a:bodyPr/>
+          <a:lstStyle/>
+          <a:p>
+            <a:r>
+              <a:rPr lang="sv-SE" dirty="0"/>
+              <a:t>Demo: Introducera prisuppslag</a:t>
+            </a:r>
+          </a:p>
+        </p:txBody>
+      </p:sp>
+      <p:sp>
+        <p:nvSpPr>
+          <p:cNvPr id="3" name="Platshållare för innehåll 2">
+            <a:extLst>
+              <a:ext uri="{FF2B5EF4-FFF2-40B4-BE49-F238E27FC236}">
+                <a16:creationId xmlns:a16="http://schemas.microsoft.com/office/drawing/2014/main" id="{986C41B0-554C-419B-AA2E-1C769BA25120}"/>
+              </a:ext>
+            </a:extLst>
+          </p:cNvPr>
+          <p:cNvSpPr>
+            <a:spLocks noGrp="1"/>
+          </p:cNvSpPr>
+          <p:nvPr>
+            <p:ph idx="1"/>
+          </p:nvPr>
+        </p:nvSpPr>
+        <p:spPr/>
+        <p:txBody>
+          <a:bodyPr/>
+          <a:lstStyle/>
+          <a:p>
+            <a:r>
+              <a:rPr lang="sv-SE" dirty="0"/>
+              <a:t>Vid betalning av kundvagn ska det vara rätt pris</a:t>
+            </a:r>
+          </a:p>
+        </p:txBody>
+      </p:sp>
+    </p:spTree>
+    <p:extLst>
+      <p:ext uri="{BB962C8B-B14F-4D97-AF65-F5344CB8AC3E}">
+        <p14:creationId xmlns:p14="http://schemas.microsoft.com/office/powerpoint/2010/main" val="2795659944"/>
+      </p:ext>
+    </p:extLst>
+  </p:cSld>
+  <p:clrMapOvr>
+    <a:masterClrMapping/>
+  </p:clrMapOvr>
+</p:sld>
+</file>
+
+<file path=ppt/slides/slide6.xml><?xml version="1.0" encoding="utf-8"?>
+<p:sld xmlns:a="http://schemas.openxmlformats.org/drawingml/2006/main" xmlns:r="http://schemas.openxmlformats.org/officeDocument/2006/relationships" xmlns:p="http://schemas.openxmlformats.org/presentationml/2006/main">
+  <p:cSld>
+    <p:spTree>
+      <p:nvGrpSpPr>
+        <p:cNvPr id="1" name=""/>
+        <p:cNvGrpSpPr/>
+        <p:nvPr/>
+      </p:nvGrpSpPr>
+      <p:grpSpPr>
+        <a:xfrm>
+          <a:off x="0" y="0"/>
+          <a:ext cx="0" cy="0"/>
+          <a:chOff x="0" y="0"/>
+          <a:chExt cx="0" cy="0"/>
+        </a:xfrm>
+      </p:grpSpPr>
+      <p:sp>
+        <p:nvSpPr>
+          <p:cNvPr id="2" name="Rubrik 1">
+            <a:extLst>
+              <a:ext uri="{FF2B5EF4-FFF2-40B4-BE49-F238E27FC236}">
                 <a16:creationId xmlns:a16="http://schemas.microsoft.com/office/drawing/2014/main" id="{AB000211-4219-4AB3-9D8E-A25EBDCDD625}"/>
               </a:ext>
             </a:extLst>
@@ -3922,7 +4043,7 @@
 </p:sld>
 </file>
 
-<file path=ppt/slides/slide6.xml><?xml version="1.0" encoding="utf-8"?>
+<file path=ppt/slides/slide7.xml><?xml version="1.0" encoding="utf-8"?>
 <p:sld xmlns:a="http://schemas.openxmlformats.org/drawingml/2006/main" xmlns:r="http://schemas.openxmlformats.org/officeDocument/2006/relationships" xmlns:p="http://schemas.openxmlformats.org/presentationml/2006/main">
   <p:cSld>
     <p:spTree>

</xml_diff>